<commit_message>
add .xml, update .pptx
</commit_message>
<xml_diff>
--- a/My_Task_Charles_rewrite_modification.pptx
+++ b/My_Task_Charles_rewrite_modification.pptx
@@ -123,6 +123,11 @@
       </a:defRPr>
     </a:lvl9pPr>
   </p:defaultTextStyle>
+  <p:extLst>
+    <p:ext uri="{EFAFB233-063F-42B5-8137-9DF3F51BA10A}">
+      <p15:sldGuideLst xmlns:p15="http://schemas.microsoft.com/office/powerpoint/2012/main"/>
+    </p:ext>
+  </p:extLst>
 </p:presentation>
 </file>
 
@@ -848,7 +853,7 @@
           <a:p>
             <a:fld id="{84CF8045-8954-4DB4-BA2E-4C0416D954F8}" type="datetimeFigureOut">
               <a:rPr lang="ru-RU" smtClean="0"/>
-              <a:t>28.04.2021</a:t>
+              <a:t>29.04.2021</a:t>
             </a:fld>
             <a:endParaRPr lang="ru-RU"/>
           </a:p>
@@ -1099,7 +1104,7 @@
           <a:p>
             <a:fld id="{84CF8045-8954-4DB4-BA2E-4C0416D954F8}" type="datetimeFigureOut">
               <a:rPr lang="ru-RU" smtClean="0"/>
-              <a:t>28.04.2021</a:t>
+              <a:t>29.04.2021</a:t>
             </a:fld>
             <a:endParaRPr lang="ru-RU"/>
           </a:p>
@@ -1413,7 +1418,7 @@
           <a:p>
             <a:fld id="{84CF8045-8954-4DB4-BA2E-4C0416D954F8}" type="datetimeFigureOut">
               <a:rPr lang="ru-RU" smtClean="0"/>
-              <a:t>28.04.2021</a:t>
+              <a:t>29.04.2021</a:t>
             </a:fld>
             <a:endParaRPr lang="ru-RU"/>
           </a:p>
@@ -1754,7 +1759,7 @@
           <a:p>
             <a:fld id="{84CF8045-8954-4DB4-BA2E-4C0416D954F8}" type="datetimeFigureOut">
               <a:rPr lang="ru-RU" smtClean="0"/>
-              <a:t>28.04.2021</a:t>
+              <a:t>29.04.2021</a:t>
             </a:fld>
             <a:endParaRPr lang="ru-RU"/>
           </a:p>
@@ -2068,7 +2073,7 @@
           <a:p>
             <a:fld id="{84CF8045-8954-4DB4-BA2E-4C0416D954F8}" type="datetimeFigureOut">
               <a:rPr lang="ru-RU" smtClean="0"/>
-              <a:t>28.04.2021</a:t>
+              <a:t>29.04.2021</a:t>
             </a:fld>
             <a:endParaRPr lang="ru-RU"/>
           </a:p>
@@ -2461,7 +2466,7 @@
           <a:p>
             <a:fld id="{84CF8045-8954-4DB4-BA2E-4C0416D954F8}" type="datetimeFigureOut">
               <a:rPr lang="ru-RU" smtClean="0"/>
-              <a:t>28.04.2021</a:t>
+              <a:t>29.04.2021</a:t>
             </a:fld>
             <a:endParaRPr lang="ru-RU"/>
           </a:p>
@@ -2631,7 +2636,7 @@
           <a:p>
             <a:fld id="{84CF8045-8954-4DB4-BA2E-4C0416D954F8}" type="datetimeFigureOut">
               <a:rPr lang="ru-RU" smtClean="0"/>
-              <a:t>28.04.2021</a:t>
+              <a:t>29.04.2021</a:t>
             </a:fld>
             <a:endParaRPr lang="ru-RU"/>
           </a:p>
@@ -2811,7 +2816,7 @@
           <a:p>
             <a:fld id="{84CF8045-8954-4DB4-BA2E-4C0416D954F8}" type="datetimeFigureOut">
               <a:rPr lang="ru-RU" smtClean="0"/>
-              <a:t>28.04.2021</a:t>
+              <a:t>29.04.2021</a:t>
             </a:fld>
             <a:endParaRPr lang="ru-RU"/>
           </a:p>
@@ -2987,7 +2992,7 @@
           <a:p>
             <a:fld id="{84CF8045-8954-4DB4-BA2E-4C0416D954F8}" type="datetimeFigureOut">
               <a:rPr lang="ru-RU" smtClean="0"/>
-              <a:t>28.04.2021</a:t>
+              <a:t>29.04.2021</a:t>
             </a:fld>
             <a:endParaRPr lang="ru-RU"/>
           </a:p>
@@ -3234,7 +3239,7 @@
           <a:p>
             <a:fld id="{84CF8045-8954-4DB4-BA2E-4C0416D954F8}" type="datetimeFigureOut">
               <a:rPr lang="ru-RU" smtClean="0"/>
-              <a:t>28.04.2021</a:t>
+              <a:t>29.04.2021</a:t>
             </a:fld>
             <a:endParaRPr lang="ru-RU"/>
           </a:p>
@@ -3466,7 +3471,7 @@
           <a:p>
             <a:fld id="{84CF8045-8954-4DB4-BA2E-4C0416D954F8}" type="datetimeFigureOut">
               <a:rPr lang="ru-RU" smtClean="0"/>
-              <a:t>28.04.2021</a:t>
+              <a:t>29.04.2021</a:t>
             </a:fld>
             <a:endParaRPr lang="ru-RU"/>
           </a:p>
@@ -3840,7 +3845,7 @@
           <a:p>
             <a:fld id="{84CF8045-8954-4DB4-BA2E-4C0416D954F8}" type="datetimeFigureOut">
               <a:rPr lang="ru-RU" smtClean="0"/>
-              <a:t>28.04.2021</a:t>
+              <a:t>29.04.2021</a:t>
             </a:fld>
             <a:endParaRPr lang="ru-RU"/>
           </a:p>
@@ -3963,7 +3968,7 @@
           <a:p>
             <a:fld id="{84CF8045-8954-4DB4-BA2E-4C0416D954F8}" type="datetimeFigureOut">
               <a:rPr lang="ru-RU" smtClean="0"/>
-              <a:t>28.04.2021</a:t>
+              <a:t>29.04.2021</a:t>
             </a:fld>
             <a:endParaRPr lang="ru-RU"/>
           </a:p>
@@ -4058,7 +4063,7 @@
           <a:p>
             <a:fld id="{84CF8045-8954-4DB4-BA2E-4C0416D954F8}" type="datetimeFigureOut">
               <a:rPr lang="ru-RU" smtClean="0"/>
-              <a:t>28.04.2021</a:t>
+              <a:t>29.04.2021</a:t>
             </a:fld>
             <a:endParaRPr lang="ru-RU"/>
           </a:p>
@@ -4313,7 +4318,7 @@
           <a:p>
             <a:fld id="{84CF8045-8954-4DB4-BA2E-4C0416D954F8}" type="datetimeFigureOut">
               <a:rPr lang="ru-RU" smtClean="0"/>
-              <a:t>28.04.2021</a:t>
+              <a:t>29.04.2021</a:t>
             </a:fld>
             <a:endParaRPr lang="ru-RU"/>
           </a:p>
@@ -4576,7 +4581,7 @@
           <a:p>
             <a:fld id="{84CF8045-8954-4DB4-BA2E-4C0416D954F8}" type="datetimeFigureOut">
               <a:rPr lang="ru-RU" smtClean="0"/>
-              <a:t>28.04.2021</a:t>
+              <a:t>29.04.2021</a:t>
             </a:fld>
             <a:endParaRPr lang="ru-RU"/>
           </a:p>
@@ -5319,7 +5324,7 @@
           <a:p>
             <a:fld id="{84CF8045-8954-4DB4-BA2E-4C0416D954F8}" type="datetimeFigureOut">
               <a:rPr lang="ru-RU" smtClean="0"/>
-              <a:t>28.04.2021</a:t>
+              <a:t>29.04.2021</a:t>
             </a:fld>
             <a:endParaRPr lang="ru-RU"/>
           </a:p>
@@ -7531,11 +7536,7 @@
             </a:r>
             <a:r>
               <a:rPr lang="ru-RU" sz="2800" dirty="0" smtClean="0"/>
-              <a:t> </a:t>
-            </a:r>
-            <a:r>
-              <a:rPr lang="ru-RU" sz="2800" dirty="0" smtClean="0"/>
-              <a:t>в </a:t>
+              <a:t> в </a:t>
             </a:r>
             <a:r>
               <a:rPr lang="en-US" sz="2800" dirty="0" smtClean="0"/>
@@ -8213,11 +8214,11 @@
               <a:t>Enviro</a:t>
             </a:r>
             <a:r>
-              <a:rPr lang="ru-RU" sz="3200" b="1" dirty="0" smtClean="0"/>
-              <a:t>т</a:t>
-            </a:r>
-            <a:r>
-              <a:rPr lang="en-US" sz="3200" b="1" dirty="0" err="1" smtClean="0"/>
+              <a:rPr lang="en-US" sz="3200" b="1" dirty="0"/>
+              <a:t>n</a:t>
+            </a:r>
+            <a:r>
+              <a:rPr lang="en-US" sz="3200" b="1" dirty="0" smtClean="0"/>
               <a:t>ment</a:t>
             </a:r>
             <a:r>

</xml_diff>

<commit_message>
add My_Task_2, update My_Task
</commit_message>
<xml_diff>
--- a/My_Task_Charles_rewrite_modification.pptx
+++ b/My_Task_Charles_rewrite_modification.pptx
@@ -6286,15 +6286,19 @@
             </a:r>
             <a:r>
               <a:rPr lang="en-US" sz="2700" dirty="0"/>
-              <a:t> - </a:t>
-            </a:r>
-            <a:r>
-              <a:rPr lang="ru-RU" sz="2700" dirty="0"/>
-              <a:t>наименование </a:t>
-            </a:r>
-            <a:r>
-              <a:rPr lang="ru-RU" sz="2700" dirty="0" smtClean="0"/>
-              <a:t>запроса </a:t>
+              <a:t> </a:t>
+            </a:r>
+            <a:r>
+              <a:rPr lang="en-US" sz="2700"/>
+              <a:t>- </a:t>
+            </a:r>
+            <a:r>
+              <a:rPr lang="en-US" sz="2400"/>
+              <a:t>endpoint</a:t>
+            </a:r>
+            <a:r>
+              <a:rPr lang="ru-RU" sz="2700" smtClean="0"/>
+              <a:t> </a:t>
             </a:r>
             <a:r>
               <a:rPr lang="en-US" sz="2700" dirty="0" smtClean="0"/>

</xml_diff>